<commit_message>
Added customizable playback speed controls and new buttons for faster and slower actions in visualization.
</commit_message>
<xml_diff>
--- a/assetssrc/buttons.pptx
+++ b/assetssrc/buttons.pptx
@@ -3260,7 +3260,7 @@
           <a:p>
             <a:fld id="{05F25DE2-B715-4EA4-8CF0-DA425EA806A7}" type="datetimeFigureOut">
               <a:rPr lang="en-GB" smtClean="0"/>
-              <a:t>20/08/2025</a:t>
+              <a:t>29/08/2025</a:t>
             </a:fld>
             <a:endParaRPr lang="en-GB"/>
           </a:p>
@@ -9039,6 +9039,330 @@
           </a:solidFill>
           <a:ln>
             <a:noFill/>
+          </a:ln>
+        </p:spPr>
+        <p:style>
+          <a:lnRef idx="2">
+            <a:schemeClr val="accent1">
+              <a:shade val="15000"/>
+            </a:schemeClr>
+          </a:lnRef>
+          <a:fillRef idx="1">
+            <a:schemeClr val="accent1"/>
+          </a:fillRef>
+          <a:effectRef idx="0">
+            <a:schemeClr val="accent1"/>
+          </a:effectRef>
+          <a:fontRef idx="minor">
+            <a:schemeClr val="lt1"/>
+          </a:fontRef>
+        </p:style>
+        <p:txBody>
+          <a:bodyPr rtlCol="0" anchor="ctr"/>
+          <a:lstStyle/>
+          <a:p>
+            <a:pPr algn="ctr"/>
+            <a:endParaRPr lang="en-US"/>
+          </a:p>
+        </p:txBody>
+      </p:sp>
+      <p:sp>
+        <p:nvSpPr>
+          <p:cNvPr id="9" name="Rounded Rectangle 8">
+            <a:extLst>
+              <a:ext uri="{FF2B5EF4-FFF2-40B4-BE49-F238E27FC236}">
+                <a16:creationId xmlns:a16="http://schemas.microsoft.com/office/drawing/2014/main" id="{E357C8AC-8F86-1D19-F944-38ABDFF174CD}"/>
+              </a:ext>
+            </a:extLst>
+          </p:cNvPr>
+          <p:cNvSpPr/>
+          <p:nvPr/>
+        </p:nvSpPr>
+        <p:spPr>
+          <a:xfrm>
+            <a:off x="713016" y="1525540"/>
+            <a:ext cx="179726" cy="179726"/>
+          </a:xfrm>
+          <a:prstGeom prst="roundRect">
+            <a:avLst/>
+          </a:prstGeom>
+          <a:solidFill>
+            <a:schemeClr val="bg1"/>
+          </a:solidFill>
+          <a:ln w="12700">
+            <a:solidFill>
+              <a:schemeClr val="bg2"/>
+            </a:solidFill>
+          </a:ln>
+        </p:spPr>
+        <p:style>
+          <a:lnRef idx="2">
+            <a:schemeClr val="accent1">
+              <a:shade val="15000"/>
+            </a:schemeClr>
+          </a:lnRef>
+          <a:fillRef idx="1">
+            <a:schemeClr val="accent1"/>
+          </a:fillRef>
+          <a:effectRef idx="0">
+            <a:schemeClr val="accent1"/>
+          </a:effectRef>
+          <a:fontRef idx="minor">
+            <a:schemeClr val="lt1"/>
+          </a:fontRef>
+        </p:style>
+        <p:txBody>
+          <a:bodyPr rtlCol="0" anchor="ctr"/>
+          <a:lstStyle/>
+          <a:p>
+            <a:pPr algn="ctr"/>
+            <a:endParaRPr lang="en-US"/>
+          </a:p>
+        </p:txBody>
+      </p:sp>
+      <p:sp>
+        <p:nvSpPr>
+          <p:cNvPr id="14" name="Triangle 13">
+            <a:extLst>
+              <a:ext uri="{FF2B5EF4-FFF2-40B4-BE49-F238E27FC236}">
+                <a16:creationId xmlns:a16="http://schemas.microsoft.com/office/drawing/2014/main" id="{EDE8A72E-0E7D-4455-2861-1CA131C27241}"/>
+              </a:ext>
+            </a:extLst>
+          </p:cNvPr>
+          <p:cNvSpPr/>
+          <p:nvPr/>
+        </p:nvSpPr>
+        <p:spPr>
+          <a:xfrm rot="5400000">
+            <a:off x="739731" y="1592543"/>
+            <a:ext cx="81766" cy="45720"/>
+          </a:xfrm>
+          <a:prstGeom prst="triangle">
+            <a:avLst/>
+          </a:prstGeom>
+          <a:solidFill>
+            <a:schemeClr val="bg2"/>
+          </a:solidFill>
+          <a:ln>
+            <a:solidFill>
+              <a:schemeClr val="bg2"/>
+            </a:solidFill>
+          </a:ln>
+        </p:spPr>
+        <p:style>
+          <a:lnRef idx="2">
+            <a:schemeClr val="accent1">
+              <a:shade val="15000"/>
+            </a:schemeClr>
+          </a:lnRef>
+          <a:fillRef idx="1">
+            <a:schemeClr val="accent1"/>
+          </a:fillRef>
+          <a:effectRef idx="0">
+            <a:schemeClr val="accent1"/>
+          </a:effectRef>
+          <a:fontRef idx="minor">
+            <a:schemeClr val="lt1"/>
+          </a:fontRef>
+        </p:style>
+        <p:txBody>
+          <a:bodyPr rtlCol="0" anchor="ctr"/>
+          <a:lstStyle/>
+          <a:p>
+            <a:pPr algn="ctr"/>
+            <a:endParaRPr lang="en-US"/>
+          </a:p>
+        </p:txBody>
+      </p:sp>
+      <p:sp>
+        <p:nvSpPr>
+          <p:cNvPr id="16" name="Triangle 15">
+            <a:extLst>
+              <a:ext uri="{FF2B5EF4-FFF2-40B4-BE49-F238E27FC236}">
+                <a16:creationId xmlns:a16="http://schemas.microsoft.com/office/drawing/2014/main" id="{4500A5B5-0E3D-602B-5F13-1DDF5E0EAE3C}"/>
+              </a:ext>
+            </a:extLst>
+          </p:cNvPr>
+          <p:cNvSpPr/>
+          <p:nvPr/>
+        </p:nvSpPr>
+        <p:spPr>
+          <a:xfrm rot="5400000">
+            <a:off x="798464" y="1592543"/>
+            <a:ext cx="81766" cy="45719"/>
+          </a:xfrm>
+          <a:prstGeom prst="triangle">
+            <a:avLst/>
+          </a:prstGeom>
+          <a:solidFill>
+            <a:schemeClr val="bg2"/>
+          </a:solidFill>
+          <a:ln>
+            <a:solidFill>
+              <a:schemeClr val="bg2"/>
+            </a:solidFill>
+          </a:ln>
+        </p:spPr>
+        <p:style>
+          <a:lnRef idx="2">
+            <a:schemeClr val="accent1">
+              <a:shade val="15000"/>
+            </a:schemeClr>
+          </a:lnRef>
+          <a:fillRef idx="1">
+            <a:schemeClr val="accent1"/>
+          </a:fillRef>
+          <a:effectRef idx="0">
+            <a:schemeClr val="accent1"/>
+          </a:effectRef>
+          <a:fontRef idx="minor">
+            <a:schemeClr val="lt1"/>
+          </a:fontRef>
+        </p:style>
+        <p:txBody>
+          <a:bodyPr rtlCol="0" anchor="ctr"/>
+          <a:lstStyle/>
+          <a:p>
+            <a:pPr algn="ctr"/>
+            <a:endParaRPr lang="en-US"/>
+          </a:p>
+        </p:txBody>
+      </p:sp>
+      <p:sp>
+        <p:nvSpPr>
+          <p:cNvPr id="17" name="Rounded Rectangle 16">
+            <a:extLst>
+              <a:ext uri="{FF2B5EF4-FFF2-40B4-BE49-F238E27FC236}">
+                <a16:creationId xmlns:a16="http://schemas.microsoft.com/office/drawing/2014/main" id="{EB229B49-323B-7869-A6AF-ADA68EF04BA8}"/>
+              </a:ext>
+            </a:extLst>
+          </p:cNvPr>
+          <p:cNvSpPr/>
+          <p:nvPr/>
+        </p:nvSpPr>
+        <p:spPr>
+          <a:xfrm flipH="1">
+            <a:off x="713611" y="1870706"/>
+            <a:ext cx="179726" cy="179726"/>
+          </a:xfrm>
+          <a:prstGeom prst="roundRect">
+            <a:avLst/>
+          </a:prstGeom>
+          <a:solidFill>
+            <a:schemeClr val="bg1"/>
+          </a:solidFill>
+          <a:ln w="12700">
+            <a:solidFill>
+              <a:schemeClr val="bg2"/>
+            </a:solidFill>
+          </a:ln>
+        </p:spPr>
+        <p:style>
+          <a:lnRef idx="2">
+            <a:schemeClr val="accent1">
+              <a:shade val="15000"/>
+            </a:schemeClr>
+          </a:lnRef>
+          <a:fillRef idx="1">
+            <a:schemeClr val="accent1"/>
+          </a:fillRef>
+          <a:effectRef idx="0">
+            <a:schemeClr val="accent1"/>
+          </a:effectRef>
+          <a:fontRef idx="minor">
+            <a:schemeClr val="lt1"/>
+          </a:fontRef>
+        </p:style>
+        <p:txBody>
+          <a:bodyPr rtlCol="0" anchor="ctr"/>
+          <a:lstStyle/>
+          <a:p>
+            <a:pPr algn="ctr"/>
+            <a:endParaRPr lang="en-US"/>
+          </a:p>
+        </p:txBody>
+      </p:sp>
+      <p:sp>
+        <p:nvSpPr>
+          <p:cNvPr id="18" name="Triangle 17">
+            <a:extLst>
+              <a:ext uri="{FF2B5EF4-FFF2-40B4-BE49-F238E27FC236}">
+                <a16:creationId xmlns:a16="http://schemas.microsoft.com/office/drawing/2014/main" id="{AE7EADC1-F54C-0E21-348A-91A646AC15F3}"/>
+              </a:ext>
+            </a:extLst>
+          </p:cNvPr>
+          <p:cNvSpPr/>
+          <p:nvPr/>
+        </p:nvSpPr>
+        <p:spPr>
+          <a:xfrm rot="16200000" flipH="1">
+            <a:off x="729733" y="1937709"/>
+            <a:ext cx="81766" cy="45720"/>
+          </a:xfrm>
+          <a:prstGeom prst="triangle">
+            <a:avLst/>
+          </a:prstGeom>
+          <a:solidFill>
+            <a:schemeClr val="bg2"/>
+          </a:solidFill>
+          <a:ln>
+            <a:solidFill>
+              <a:schemeClr val="bg2"/>
+            </a:solidFill>
+          </a:ln>
+        </p:spPr>
+        <p:style>
+          <a:lnRef idx="2">
+            <a:schemeClr val="accent1">
+              <a:shade val="15000"/>
+            </a:schemeClr>
+          </a:lnRef>
+          <a:fillRef idx="1">
+            <a:schemeClr val="accent1"/>
+          </a:fillRef>
+          <a:effectRef idx="0">
+            <a:schemeClr val="accent1"/>
+          </a:effectRef>
+          <a:fontRef idx="minor">
+            <a:schemeClr val="lt1"/>
+          </a:fontRef>
+        </p:style>
+        <p:txBody>
+          <a:bodyPr rtlCol="0" anchor="ctr"/>
+          <a:lstStyle/>
+          <a:p>
+            <a:pPr algn="ctr"/>
+            <a:endParaRPr lang="en-US"/>
+          </a:p>
+        </p:txBody>
+      </p:sp>
+      <p:sp>
+        <p:nvSpPr>
+          <p:cNvPr id="19" name="Triangle 18">
+            <a:extLst>
+              <a:ext uri="{FF2B5EF4-FFF2-40B4-BE49-F238E27FC236}">
+                <a16:creationId xmlns:a16="http://schemas.microsoft.com/office/drawing/2014/main" id="{66D631BA-8AB1-65E1-2073-34A0A9988232}"/>
+              </a:ext>
+            </a:extLst>
+          </p:cNvPr>
+          <p:cNvSpPr/>
+          <p:nvPr/>
+        </p:nvSpPr>
+        <p:spPr>
+          <a:xfrm rot="16200000" flipH="1">
+            <a:off x="788466" y="1937709"/>
+            <a:ext cx="81766" cy="45719"/>
+          </a:xfrm>
+          <a:prstGeom prst="triangle">
+            <a:avLst/>
+          </a:prstGeom>
+          <a:solidFill>
+            <a:schemeClr val="bg2"/>
+          </a:solidFill>
+          <a:ln>
+            <a:solidFill>
+              <a:schemeClr val="bg2"/>
+            </a:solidFill>
           </a:ln>
         </p:spPr>
         <p:style>

</xml_diff>

<commit_message>
chore: updated clock img
</commit_message>
<xml_diff>
--- a/assetssrc/buttons.pptx
+++ b/assetssrc/buttons.pptx
@@ -3260,7 +3260,7 @@
           <a:p>
             <a:fld id="{05F25DE2-B715-4EA4-8CF0-DA425EA806A7}" type="datetimeFigureOut">
               <a:rPr lang="en-GB" smtClean="0"/>
-              <a:t>29/08/2025</a:t>
+              <a:t>20/09/2025</a:t>
             </a:fld>
             <a:endParaRPr lang="en-GB"/>
           </a:p>
@@ -9390,6 +9390,580 @@
           </a:p>
         </p:txBody>
       </p:sp>
+      <p:sp>
+        <p:nvSpPr>
+          <p:cNvPr id="15" name="Rounded Rectangle 7">
+            <a:extLst>
+              <a:ext uri="{FF2B5EF4-FFF2-40B4-BE49-F238E27FC236}">
+                <a16:creationId xmlns:a16="http://schemas.microsoft.com/office/drawing/2014/main" id="{15AD7E19-AFD8-FF3D-8DE6-4DD0746D08F8}"/>
+              </a:ext>
+            </a:extLst>
+          </p:cNvPr>
+          <p:cNvSpPr/>
+          <p:nvPr/>
+        </p:nvSpPr>
+        <p:spPr>
+          <a:xfrm>
+            <a:off x="1672953" y="583474"/>
+            <a:ext cx="450000" cy="450000"/>
+          </a:xfrm>
+          <a:prstGeom prst="roundRect">
+            <a:avLst/>
+          </a:prstGeom>
+          <a:solidFill>
+            <a:schemeClr val="bg1"/>
+          </a:solidFill>
+          <a:ln w="19050">
+            <a:solidFill>
+              <a:schemeClr val="bg2"/>
+            </a:solidFill>
+          </a:ln>
+        </p:spPr>
+        <p:style>
+          <a:lnRef idx="2">
+            <a:schemeClr val="accent1">
+              <a:shade val="15000"/>
+            </a:schemeClr>
+          </a:lnRef>
+          <a:fillRef idx="1">
+            <a:schemeClr val="accent1"/>
+          </a:fillRef>
+          <a:effectRef idx="0">
+            <a:schemeClr val="accent1"/>
+          </a:effectRef>
+          <a:fontRef idx="minor">
+            <a:schemeClr val="lt1"/>
+          </a:fontRef>
+        </p:style>
+        <p:txBody>
+          <a:bodyPr rtlCol="0" anchor="ctr"/>
+          <a:lstStyle/>
+          <a:p>
+            <a:pPr algn="ctr"/>
+            <a:endParaRPr lang="en-US"/>
+          </a:p>
+        </p:txBody>
+      </p:sp>
+      <p:grpSp>
+        <p:nvGrpSpPr>
+          <p:cNvPr id="47" name="Group 46">
+            <a:extLst>
+              <a:ext uri="{FF2B5EF4-FFF2-40B4-BE49-F238E27FC236}">
+                <a16:creationId xmlns:a16="http://schemas.microsoft.com/office/drawing/2014/main" id="{37FC92E4-8E12-6847-807F-6C53F547AD24}"/>
+              </a:ext>
+            </a:extLst>
+          </p:cNvPr>
+          <p:cNvGrpSpPr/>
+          <p:nvPr/>
+        </p:nvGrpSpPr>
+        <p:grpSpPr>
+          <a:xfrm>
+            <a:off x="1695643" y="600662"/>
+            <a:ext cx="404620" cy="411144"/>
+            <a:chOff x="1717953" y="623331"/>
+            <a:chExt cx="360000" cy="365805"/>
+          </a:xfrm>
+        </p:grpSpPr>
+        <p:sp>
+          <p:nvSpPr>
+            <p:cNvPr id="20" name="Oval 19">
+              <a:extLst>
+                <a:ext uri="{FF2B5EF4-FFF2-40B4-BE49-F238E27FC236}">
+                  <a16:creationId xmlns:a16="http://schemas.microsoft.com/office/drawing/2014/main" id="{23A50D98-093E-5926-4CE8-DCE9108B5538}"/>
+                </a:ext>
+              </a:extLst>
+            </p:cNvPr>
+            <p:cNvSpPr/>
+            <p:nvPr/>
+          </p:nvSpPr>
+          <p:spPr>
+            <a:xfrm>
+              <a:off x="1717953" y="629136"/>
+              <a:ext cx="360000" cy="360000"/>
+            </a:xfrm>
+            <a:prstGeom prst="ellipse">
+              <a:avLst/>
+            </a:prstGeom>
+            <a:solidFill>
+              <a:schemeClr val="bg1">
+                <a:lumMod val="95000"/>
+              </a:schemeClr>
+            </a:solidFill>
+            <a:ln>
+              <a:solidFill>
+                <a:schemeClr val="bg2"/>
+              </a:solidFill>
+            </a:ln>
+          </p:spPr>
+          <p:style>
+            <a:lnRef idx="2">
+              <a:schemeClr val="accent5">
+                <a:shade val="15000"/>
+              </a:schemeClr>
+            </a:lnRef>
+            <a:fillRef idx="1">
+              <a:schemeClr val="accent5"/>
+            </a:fillRef>
+            <a:effectRef idx="0">
+              <a:schemeClr val="accent5"/>
+            </a:effectRef>
+            <a:fontRef idx="minor">
+              <a:schemeClr val="lt1"/>
+            </a:fontRef>
+          </p:style>
+          <p:txBody>
+            <a:bodyPr rtlCol="0" anchor="ctr"/>
+            <a:lstStyle/>
+            <a:p>
+              <a:pPr algn="ctr"/>
+              <a:endParaRPr lang="en-AU"/>
+            </a:p>
+          </p:txBody>
+        </p:sp>
+        <p:cxnSp>
+          <p:nvCxnSpPr>
+            <p:cNvPr id="24" name="Straight Connector 23">
+              <a:extLst>
+                <a:ext uri="{FF2B5EF4-FFF2-40B4-BE49-F238E27FC236}">
+                  <a16:creationId xmlns:a16="http://schemas.microsoft.com/office/drawing/2014/main" id="{CDB74979-718C-B424-A340-FBC4DA011FBA}"/>
+                </a:ext>
+              </a:extLst>
+            </p:cNvPr>
+            <p:cNvCxnSpPr>
+              <a:cxnSpLocks/>
+              <a:stCxn id="20" idx="0"/>
+              <a:endCxn id="20" idx="0"/>
+            </p:cNvCxnSpPr>
+            <p:nvPr/>
+          </p:nvCxnSpPr>
+          <p:spPr>
+            <a:xfrm>
+              <a:off x="1897953" y="629136"/>
+              <a:ext cx="0" cy="0"/>
+            </a:xfrm>
+            <a:prstGeom prst="line">
+              <a:avLst/>
+            </a:prstGeom>
+            <a:ln>
+              <a:solidFill>
+                <a:schemeClr val="bg2"/>
+              </a:solidFill>
+            </a:ln>
+          </p:spPr>
+          <p:style>
+            <a:lnRef idx="1">
+              <a:schemeClr val="accent5"/>
+            </a:lnRef>
+            <a:fillRef idx="0">
+              <a:schemeClr val="accent5"/>
+            </a:fillRef>
+            <a:effectRef idx="0">
+              <a:schemeClr val="accent5"/>
+            </a:effectRef>
+            <a:fontRef idx="minor">
+              <a:schemeClr val="tx1"/>
+            </a:fontRef>
+          </p:style>
+        </p:cxnSp>
+        <p:cxnSp>
+          <p:nvCxnSpPr>
+            <p:cNvPr id="27" name="Straight Connector 26">
+              <a:extLst>
+                <a:ext uri="{FF2B5EF4-FFF2-40B4-BE49-F238E27FC236}">
+                  <a16:creationId xmlns:a16="http://schemas.microsoft.com/office/drawing/2014/main" id="{FCBE9245-6825-74D8-6DAE-BF683AF88A32}"/>
+                </a:ext>
+              </a:extLst>
+            </p:cNvPr>
+            <p:cNvCxnSpPr>
+              <a:cxnSpLocks/>
+            </p:cNvCxnSpPr>
+            <p:nvPr/>
+          </p:nvCxnSpPr>
+          <p:spPr>
+            <a:xfrm>
+              <a:off x="1897953" y="623331"/>
+              <a:ext cx="0" cy="100012"/>
+            </a:xfrm>
+            <a:prstGeom prst="line">
+              <a:avLst/>
+            </a:prstGeom>
+            <a:ln w="9525">
+              <a:solidFill>
+                <a:schemeClr val="bg2"/>
+              </a:solidFill>
+            </a:ln>
+          </p:spPr>
+          <p:style>
+            <a:lnRef idx="1">
+              <a:schemeClr val="accent1"/>
+            </a:lnRef>
+            <a:fillRef idx="0">
+              <a:schemeClr val="accent1"/>
+            </a:fillRef>
+            <a:effectRef idx="0">
+              <a:schemeClr val="accent1"/>
+            </a:effectRef>
+            <a:fontRef idx="minor">
+              <a:schemeClr val="tx1"/>
+            </a:fontRef>
+          </p:style>
+        </p:cxnSp>
+        <p:cxnSp>
+          <p:nvCxnSpPr>
+            <p:cNvPr id="31" name="Straight Connector 30">
+              <a:extLst>
+                <a:ext uri="{FF2B5EF4-FFF2-40B4-BE49-F238E27FC236}">
+                  <a16:creationId xmlns:a16="http://schemas.microsoft.com/office/drawing/2014/main" id="{A2A057C0-5767-FC61-B5A9-D29EC84E5A4B}"/>
+                </a:ext>
+              </a:extLst>
+            </p:cNvPr>
+            <p:cNvCxnSpPr>
+              <a:cxnSpLocks/>
+            </p:cNvCxnSpPr>
+            <p:nvPr/>
+          </p:nvCxnSpPr>
+          <p:spPr>
+            <a:xfrm rot="5400000">
+              <a:off x="2027947" y="758468"/>
+              <a:ext cx="0" cy="100012"/>
+            </a:xfrm>
+            <a:prstGeom prst="line">
+              <a:avLst/>
+            </a:prstGeom>
+            <a:ln w="9525">
+              <a:solidFill>
+                <a:schemeClr val="bg2"/>
+              </a:solidFill>
+            </a:ln>
+          </p:spPr>
+          <p:style>
+            <a:lnRef idx="1">
+              <a:schemeClr val="accent1"/>
+            </a:lnRef>
+            <a:fillRef idx="0">
+              <a:schemeClr val="accent1"/>
+            </a:fillRef>
+            <a:effectRef idx="0">
+              <a:schemeClr val="accent1"/>
+            </a:effectRef>
+            <a:fontRef idx="minor">
+              <a:schemeClr val="tx1"/>
+            </a:fontRef>
+          </p:style>
+        </p:cxnSp>
+        <p:cxnSp>
+          <p:nvCxnSpPr>
+            <p:cNvPr id="32" name="Straight Connector 31">
+              <a:extLst>
+                <a:ext uri="{FF2B5EF4-FFF2-40B4-BE49-F238E27FC236}">
+                  <a16:creationId xmlns:a16="http://schemas.microsoft.com/office/drawing/2014/main" id="{D9F42D84-C5DB-4E63-CE20-90A2B324E216}"/>
+                </a:ext>
+              </a:extLst>
+            </p:cNvPr>
+            <p:cNvCxnSpPr>
+              <a:cxnSpLocks/>
+            </p:cNvCxnSpPr>
+            <p:nvPr/>
+          </p:nvCxnSpPr>
+          <p:spPr>
+            <a:xfrm rot="10800000">
+              <a:off x="1897953" y="889124"/>
+              <a:ext cx="0" cy="100012"/>
+            </a:xfrm>
+            <a:prstGeom prst="line">
+              <a:avLst/>
+            </a:prstGeom>
+            <a:ln w="9525">
+              <a:solidFill>
+                <a:schemeClr val="bg2"/>
+              </a:solidFill>
+            </a:ln>
+          </p:spPr>
+          <p:style>
+            <a:lnRef idx="1">
+              <a:schemeClr val="accent1"/>
+            </a:lnRef>
+            <a:fillRef idx="0">
+              <a:schemeClr val="accent1"/>
+            </a:fillRef>
+            <a:effectRef idx="0">
+              <a:schemeClr val="accent1"/>
+            </a:effectRef>
+            <a:fontRef idx="minor">
+              <a:schemeClr val="tx1"/>
+            </a:fontRef>
+          </p:style>
+        </p:cxnSp>
+        <p:cxnSp>
+          <p:nvCxnSpPr>
+            <p:cNvPr id="33" name="Straight Connector 32">
+              <a:extLst>
+                <a:ext uri="{FF2B5EF4-FFF2-40B4-BE49-F238E27FC236}">
+                  <a16:creationId xmlns:a16="http://schemas.microsoft.com/office/drawing/2014/main" id="{48B824EA-DEF2-9E5A-8662-AB12BE33A93A}"/>
+                </a:ext>
+              </a:extLst>
+            </p:cNvPr>
+            <p:cNvCxnSpPr>
+              <a:cxnSpLocks/>
+            </p:cNvCxnSpPr>
+            <p:nvPr/>
+          </p:nvCxnSpPr>
+          <p:spPr>
+            <a:xfrm rot="16200000">
+              <a:off x="1770356" y="758468"/>
+              <a:ext cx="0" cy="100012"/>
+            </a:xfrm>
+            <a:prstGeom prst="line">
+              <a:avLst/>
+            </a:prstGeom>
+            <a:ln w="9525">
+              <a:solidFill>
+                <a:schemeClr val="bg2"/>
+              </a:solidFill>
+            </a:ln>
+          </p:spPr>
+          <p:style>
+            <a:lnRef idx="1">
+              <a:schemeClr val="accent1"/>
+            </a:lnRef>
+            <a:fillRef idx="0">
+              <a:schemeClr val="accent1"/>
+            </a:fillRef>
+            <a:effectRef idx="0">
+              <a:schemeClr val="accent1"/>
+            </a:effectRef>
+            <a:fontRef idx="minor">
+              <a:schemeClr val="tx1"/>
+            </a:fontRef>
+          </p:style>
+        </p:cxnSp>
+        <p:cxnSp>
+          <p:nvCxnSpPr>
+            <p:cNvPr id="34" name="Straight Connector 33">
+              <a:extLst>
+                <a:ext uri="{FF2B5EF4-FFF2-40B4-BE49-F238E27FC236}">
+                  <a16:creationId xmlns:a16="http://schemas.microsoft.com/office/drawing/2014/main" id="{9A17B083-A694-3384-562B-A386D7075B1E}"/>
+                </a:ext>
+              </a:extLst>
+            </p:cNvPr>
+            <p:cNvCxnSpPr>
+              <a:cxnSpLocks/>
+            </p:cNvCxnSpPr>
+            <p:nvPr/>
+          </p:nvCxnSpPr>
+          <p:spPr>
+            <a:xfrm flipH="1">
+              <a:off x="1978819" y="677827"/>
+              <a:ext cx="47144" cy="46073"/>
+            </a:xfrm>
+            <a:prstGeom prst="line">
+              <a:avLst/>
+            </a:prstGeom>
+            <a:ln w="9525">
+              <a:solidFill>
+                <a:schemeClr val="bg2"/>
+              </a:solidFill>
+            </a:ln>
+          </p:spPr>
+          <p:style>
+            <a:lnRef idx="1">
+              <a:schemeClr val="accent1"/>
+            </a:lnRef>
+            <a:fillRef idx="0">
+              <a:schemeClr val="accent1"/>
+            </a:fillRef>
+            <a:effectRef idx="0">
+              <a:schemeClr val="accent1"/>
+            </a:effectRef>
+            <a:fontRef idx="minor">
+              <a:schemeClr val="tx1"/>
+            </a:fontRef>
+          </p:style>
+        </p:cxnSp>
+        <p:cxnSp>
+          <p:nvCxnSpPr>
+            <p:cNvPr id="35" name="Straight Connector 34">
+              <a:extLst>
+                <a:ext uri="{FF2B5EF4-FFF2-40B4-BE49-F238E27FC236}">
+                  <a16:creationId xmlns:a16="http://schemas.microsoft.com/office/drawing/2014/main" id="{6598A230-171F-23EE-D243-7BAE4FAC6FB0}"/>
+                </a:ext>
+              </a:extLst>
+            </p:cNvPr>
+            <p:cNvCxnSpPr>
+              <a:cxnSpLocks/>
+            </p:cNvCxnSpPr>
+            <p:nvPr/>
+          </p:nvCxnSpPr>
+          <p:spPr>
+            <a:xfrm flipH="1" flipV="1">
+              <a:off x="1974056" y="883444"/>
+              <a:ext cx="49208" cy="52590"/>
+            </a:xfrm>
+            <a:prstGeom prst="line">
+              <a:avLst/>
+            </a:prstGeom>
+            <a:ln w="9525">
+              <a:solidFill>
+                <a:schemeClr val="bg2"/>
+              </a:solidFill>
+            </a:ln>
+          </p:spPr>
+          <p:style>
+            <a:lnRef idx="1">
+              <a:schemeClr val="accent1"/>
+            </a:lnRef>
+            <a:fillRef idx="0">
+              <a:schemeClr val="accent1"/>
+            </a:fillRef>
+            <a:effectRef idx="0">
+              <a:schemeClr val="accent1"/>
+            </a:effectRef>
+            <a:fontRef idx="minor">
+              <a:schemeClr val="tx1"/>
+            </a:fontRef>
+          </p:style>
+        </p:cxnSp>
+        <p:cxnSp>
+          <p:nvCxnSpPr>
+            <p:cNvPr id="36" name="Straight Connector 35">
+              <a:extLst>
+                <a:ext uri="{FF2B5EF4-FFF2-40B4-BE49-F238E27FC236}">
+                  <a16:creationId xmlns:a16="http://schemas.microsoft.com/office/drawing/2014/main" id="{3C3A0F4D-F7D9-CF2D-B01A-F4ABE086AF70}"/>
+                </a:ext>
+              </a:extLst>
+            </p:cNvPr>
+            <p:cNvCxnSpPr>
+              <a:cxnSpLocks/>
+            </p:cNvCxnSpPr>
+            <p:nvPr/>
+          </p:nvCxnSpPr>
+          <p:spPr>
+            <a:xfrm flipV="1">
+              <a:off x="1768241" y="888206"/>
+              <a:ext cx="46272" cy="49223"/>
+            </a:xfrm>
+            <a:prstGeom prst="line">
+              <a:avLst/>
+            </a:prstGeom>
+            <a:ln w="9525">
+              <a:solidFill>
+                <a:schemeClr val="bg2"/>
+              </a:solidFill>
+            </a:ln>
+          </p:spPr>
+          <p:style>
+            <a:lnRef idx="1">
+              <a:schemeClr val="accent1"/>
+            </a:lnRef>
+            <a:fillRef idx="0">
+              <a:schemeClr val="accent1"/>
+            </a:fillRef>
+            <a:effectRef idx="0">
+              <a:schemeClr val="accent1"/>
+            </a:effectRef>
+            <a:fontRef idx="minor">
+              <a:schemeClr val="tx1"/>
+            </a:fontRef>
+          </p:style>
+        </p:cxnSp>
+        <p:cxnSp>
+          <p:nvCxnSpPr>
+            <p:cNvPr id="37" name="Straight Connector 36">
+              <a:extLst>
+                <a:ext uri="{FF2B5EF4-FFF2-40B4-BE49-F238E27FC236}">
+                  <a16:creationId xmlns:a16="http://schemas.microsoft.com/office/drawing/2014/main" id="{3F0B0D25-E6E2-4D2E-9ED7-7731BB55E188}"/>
+                </a:ext>
+              </a:extLst>
+            </p:cNvPr>
+            <p:cNvCxnSpPr>
+              <a:cxnSpLocks/>
+            </p:cNvCxnSpPr>
+            <p:nvPr/>
+          </p:nvCxnSpPr>
+          <p:spPr>
+            <a:xfrm>
+              <a:off x="1769484" y="684091"/>
+              <a:ext cx="45029" cy="39809"/>
+            </a:xfrm>
+            <a:prstGeom prst="line">
+              <a:avLst/>
+            </a:prstGeom>
+            <a:ln w="9525">
+              <a:solidFill>
+                <a:schemeClr val="bg2"/>
+              </a:solidFill>
+            </a:ln>
+          </p:spPr>
+          <p:style>
+            <a:lnRef idx="1">
+              <a:schemeClr val="accent1"/>
+            </a:lnRef>
+            <a:fillRef idx="0">
+              <a:schemeClr val="accent1"/>
+            </a:fillRef>
+            <a:effectRef idx="0">
+              <a:schemeClr val="accent1"/>
+            </a:effectRef>
+            <a:fontRef idx="minor">
+              <a:schemeClr val="tx1"/>
+            </a:fontRef>
+          </p:style>
+        </p:cxnSp>
+        <p:sp>
+          <p:nvSpPr>
+            <p:cNvPr id="45" name="Oval 44">
+              <a:extLst>
+                <a:ext uri="{FF2B5EF4-FFF2-40B4-BE49-F238E27FC236}">
+                  <a16:creationId xmlns:a16="http://schemas.microsoft.com/office/drawing/2014/main" id="{A61ACB27-E8B2-1EF4-0327-7A522604F798}"/>
+                </a:ext>
+              </a:extLst>
+            </p:cNvPr>
+            <p:cNvSpPr/>
+            <p:nvPr/>
+          </p:nvSpPr>
+          <p:spPr>
+            <a:xfrm>
+              <a:off x="1881151" y="788233"/>
+              <a:ext cx="36000" cy="36000"/>
+            </a:xfrm>
+            <a:prstGeom prst="ellipse">
+              <a:avLst/>
+            </a:prstGeom>
+            <a:solidFill>
+              <a:schemeClr val="bg2"/>
+            </a:solidFill>
+            <a:ln>
+              <a:solidFill>
+                <a:schemeClr val="bg2"/>
+              </a:solidFill>
+            </a:ln>
+          </p:spPr>
+          <p:style>
+            <a:lnRef idx="2">
+              <a:schemeClr val="accent5">
+                <a:shade val="15000"/>
+              </a:schemeClr>
+            </a:lnRef>
+            <a:fillRef idx="1">
+              <a:schemeClr val="accent5"/>
+            </a:fillRef>
+            <a:effectRef idx="0">
+              <a:schemeClr val="accent5"/>
+            </a:effectRef>
+            <a:fontRef idx="minor">
+              <a:schemeClr val="lt1"/>
+            </a:fontRef>
+          </p:style>
+          <p:txBody>
+            <a:bodyPr rtlCol="0" anchor="ctr"/>
+            <a:lstStyle/>
+            <a:p>
+              <a:pPr algn="ctr"/>
+              <a:endParaRPr lang="en-AU"/>
+            </a:p>
+          </p:txBody>
+        </p:sp>
+      </p:grpSp>
     </p:spTree>
     <p:extLst>
       <p:ext uri="{BB962C8B-B14F-4D97-AF65-F5344CB8AC3E}">
@@ -9594,7 +10168,33 @@
       </a:bgFillStyleLst>
     </a:fmtScheme>
   </a:themeElements>
-  <a:objectDefaults/>
+  <a:objectDefaults>
+    <a:lnDef>
+      <a:spPr>
+        <a:ln w="19050">
+          <a:solidFill>
+            <a:schemeClr val="bg2"/>
+          </a:solidFill>
+        </a:ln>
+      </a:spPr>
+      <a:bodyPr/>
+      <a:lstStyle/>
+      <a:style>
+        <a:lnRef idx="1">
+          <a:schemeClr val="accent1"/>
+        </a:lnRef>
+        <a:fillRef idx="0">
+          <a:schemeClr val="accent1"/>
+        </a:fillRef>
+        <a:effectRef idx="0">
+          <a:schemeClr val="accent1"/>
+        </a:effectRef>
+        <a:fontRef idx="minor">
+          <a:schemeClr val="tx1"/>
+        </a:fontRef>
+      </a:style>
+    </a:lnDef>
+  </a:objectDefaults>
   <a:extraClrSchemeLst/>
   <a:extLst>
     <a:ext uri="{05A4C25C-085E-4340-85A3-A5531E510DB2}">

</xml_diff>